<commit_message>
Update to power manual
</commit_message>
<xml_diff>
--- a/doc/power/source/powerpoint.pptx
+++ b/doc/power/source/powerpoint.pptx
@@ -291,7 +291,7 @@
           <a:p>
             <a:fld id="{83427876-2B0E-4652-8CAE-775C2FD87460}" type="datetimeFigureOut">
               <a:rPr lang="en-CA" smtClean="0"/>
-              <a:t>30/10/2012</a:t>
+              <a:t>28/11/2012</a:t>
             </a:fld>
             <a:endParaRPr lang="en-CA"/>
           </a:p>
@@ -461,7 +461,7 @@
           <a:p>
             <a:fld id="{83427876-2B0E-4652-8CAE-775C2FD87460}" type="datetimeFigureOut">
               <a:rPr lang="en-CA" smtClean="0"/>
-              <a:t>30/10/2012</a:t>
+              <a:t>28/11/2012</a:t>
             </a:fld>
             <a:endParaRPr lang="en-CA"/>
           </a:p>
@@ -641,7 +641,7 @@
           <a:p>
             <a:fld id="{83427876-2B0E-4652-8CAE-775C2FD87460}" type="datetimeFigureOut">
               <a:rPr lang="en-CA" smtClean="0"/>
-              <a:t>30/10/2012</a:t>
+              <a:t>28/11/2012</a:t>
             </a:fld>
             <a:endParaRPr lang="en-CA"/>
           </a:p>
@@ -811,7 +811,7 @@
           <a:p>
             <a:fld id="{83427876-2B0E-4652-8CAE-775C2FD87460}" type="datetimeFigureOut">
               <a:rPr lang="en-CA" smtClean="0"/>
-              <a:t>30/10/2012</a:t>
+              <a:t>28/11/2012</a:t>
             </a:fld>
             <a:endParaRPr lang="en-CA"/>
           </a:p>
@@ -1057,7 +1057,7 @@
           <a:p>
             <a:fld id="{83427876-2B0E-4652-8CAE-775C2FD87460}" type="datetimeFigureOut">
               <a:rPr lang="en-CA" smtClean="0"/>
-              <a:t>30/10/2012</a:t>
+              <a:t>28/11/2012</a:t>
             </a:fld>
             <a:endParaRPr lang="en-CA"/>
           </a:p>
@@ -1345,7 +1345,7 @@
           <a:p>
             <a:fld id="{83427876-2B0E-4652-8CAE-775C2FD87460}" type="datetimeFigureOut">
               <a:rPr lang="en-CA" smtClean="0"/>
-              <a:t>30/10/2012</a:t>
+              <a:t>28/11/2012</a:t>
             </a:fld>
             <a:endParaRPr lang="en-CA"/>
           </a:p>
@@ -1767,7 +1767,7 @@
           <a:p>
             <a:fld id="{83427876-2B0E-4652-8CAE-775C2FD87460}" type="datetimeFigureOut">
               <a:rPr lang="en-CA" smtClean="0"/>
-              <a:t>30/10/2012</a:t>
+              <a:t>28/11/2012</a:t>
             </a:fld>
             <a:endParaRPr lang="en-CA"/>
           </a:p>
@@ -1885,7 +1885,7 @@
           <a:p>
             <a:fld id="{83427876-2B0E-4652-8CAE-775C2FD87460}" type="datetimeFigureOut">
               <a:rPr lang="en-CA" smtClean="0"/>
-              <a:t>30/10/2012</a:t>
+              <a:t>28/11/2012</a:t>
             </a:fld>
             <a:endParaRPr lang="en-CA"/>
           </a:p>
@@ -1980,7 +1980,7 @@
           <a:p>
             <a:fld id="{83427876-2B0E-4652-8CAE-775C2FD87460}" type="datetimeFigureOut">
               <a:rPr lang="en-CA" smtClean="0"/>
-              <a:t>30/10/2012</a:t>
+              <a:t>28/11/2012</a:t>
             </a:fld>
             <a:endParaRPr lang="en-CA"/>
           </a:p>
@@ -2257,7 +2257,7 @@
           <a:p>
             <a:fld id="{83427876-2B0E-4652-8CAE-775C2FD87460}" type="datetimeFigureOut">
               <a:rPr lang="en-CA" smtClean="0"/>
-              <a:t>30/10/2012</a:t>
+              <a:t>28/11/2012</a:t>
             </a:fld>
             <a:endParaRPr lang="en-CA"/>
           </a:p>
@@ -2510,7 +2510,7 @@
           <a:p>
             <a:fld id="{83427876-2B0E-4652-8CAE-775C2FD87460}" type="datetimeFigureOut">
               <a:rPr lang="en-CA" smtClean="0"/>
-              <a:t>30/10/2012</a:t>
+              <a:t>28/11/2012</a:t>
             </a:fld>
             <a:endParaRPr lang="en-CA"/>
           </a:p>
@@ -2723,7 +2723,7 @@
           <a:p>
             <a:fld id="{83427876-2B0E-4652-8CAE-775C2FD87460}" type="datetimeFigureOut">
               <a:rPr lang="en-CA" smtClean="0"/>
-              <a:t>30/10/2012</a:t>
+              <a:t>28/11/2012</a:t>
             </a:fld>
             <a:endParaRPr lang="en-CA"/>
           </a:p>
@@ -3199,11 +3199,6 @@
               </a:rPr>
               <a:t>ACE 2.0 (Activity Estimation)</a:t>
             </a:r>
-            <a:endParaRPr lang="en-US" sz="1200" dirty="0">
-              <a:solidFill>
-                <a:schemeClr val="tx1"/>
-              </a:solidFill>
-            </a:endParaRPr>
           </a:p>
         </p:txBody>
       </p:sp>
@@ -3363,13 +3358,8 @@
             <a:pPr algn="ctr"/>
             <a:r>
               <a:rPr lang="en-US" sz="1200" dirty="0" smtClean="0"/>
-              <a:t>ODIN </a:t>
-            </a:r>
-            <a:r>
-              <a:rPr lang="en-US" sz="1200" dirty="0" smtClean="0"/>
-              <a:t>II</a:t>
-            </a:r>
-            <a:endParaRPr lang="en-US" sz="1200" dirty="0" smtClean="0"/>
+              <a:t>ODIN II</a:t>
+            </a:r>
           </a:p>
         </p:txBody>
       </p:sp>
@@ -3610,7 +3600,6 @@
               <a:rPr lang="en-US" sz="1200" dirty="0" smtClean="0"/>
               <a:t>ABC</a:t>
             </a:r>
-            <a:endParaRPr lang="en-US" sz="1200" dirty="0" smtClean="0"/>
           </a:p>
         </p:txBody>
       </p:sp>

</xml_diff>